<commit_message>
-Neuen Sound gefunden -Planungspräsentation V. 5 Juli .pptx wiederhergestellt und verändert
</commit_message>
<xml_diff>
--- a/Planungspraesentation-Mitte Juni/Planungspräsentation V. 5 Juli .pptx
+++ b/Planungspraesentation-Mitte Juni/Planungspräsentation V. 5 Juli .pptx
@@ -216,7 +216,7 @@
           <a:p>
             <a:fld id="{B4FF162B-CE6F-6948-9E4E-CF339F017EF0}" type="datetime1">
               <a:rPr lang="de-DE" smtClean="0"/>
-              <a:t>01.07.2015</a:t>
+              <a:t>05.09.2015</a:t>
             </a:fld>
             <a:endParaRPr lang="de-DE"/>
           </a:p>
@@ -382,7 +382,7 @@
           <a:p>
             <a:fld id="{F8F687C1-49B9-FC43-A5F5-4E2CAE8623DA}" type="datetime1">
               <a:rPr lang="de-DE" smtClean="0"/>
-              <a:t>01.07.2015</a:t>
+              <a:t>05.09.2015</a:t>
             </a:fld>
             <a:endParaRPr lang="de-DE"/>
           </a:p>
@@ -832,7 +832,7 @@
           <a:p>
             <a:fld id="{1DACE3BB-339C-AD47-A52D-662320F7C205}" type="datetime1">
               <a:rPr lang="de-DE" smtClean="0"/>
-              <a:t>01.07.2015</a:t>
+              <a:t>05.09.2015</a:t>
             </a:fld>
             <a:endParaRPr lang="de-DE"/>
           </a:p>
@@ -1002,7 +1002,7 @@
           <a:p>
             <a:fld id="{F42559F4-B3EB-344D-B633-69F007223D30}" type="datetime1">
               <a:rPr lang="de-DE" smtClean="0"/>
-              <a:t>01.07.2015</a:t>
+              <a:t>05.09.2015</a:t>
             </a:fld>
             <a:endParaRPr lang="de-DE"/>
           </a:p>
@@ -1182,7 +1182,7 @@
           <a:p>
             <a:fld id="{42AF2205-F992-9F41-987F-7238F8B9F0B5}" type="datetime1">
               <a:rPr lang="de-DE" smtClean="0"/>
-              <a:t>01.07.2015</a:t>
+              <a:t>05.09.2015</a:t>
             </a:fld>
             <a:endParaRPr lang="de-DE"/>
           </a:p>
@@ -1352,7 +1352,7 @@
           <a:p>
             <a:fld id="{FF84A754-A284-FB40-B909-6C25294AD20F}" type="datetime1">
               <a:rPr lang="de-DE" smtClean="0"/>
-              <a:t>01.07.2015</a:t>
+              <a:t>05.09.2015</a:t>
             </a:fld>
             <a:endParaRPr lang="de-DE"/>
           </a:p>
@@ -1598,7 +1598,7 @@
           <a:p>
             <a:fld id="{CA605955-6352-BD4C-B0F3-ECEE8C6EE720}" type="datetime1">
               <a:rPr lang="de-DE" smtClean="0"/>
-              <a:t>01.07.2015</a:t>
+              <a:t>05.09.2015</a:t>
             </a:fld>
             <a:endParaRPr lang="de-DE"/>
           </a:p>
@@ -1886,7 +1886,7 @@
           <a:p>
             <a:fld id="{C86AEEF6-0385-0844-9861-D3417F6C1E98}" type="datetime1">
               <a:rPr lang="de-DE" smtClean="0"/>
-              <a:t>01.07.2015</a:t>
+              <a:t>05.09.2015</a:t>
             </a:fld>
             <a:endParaRPr lang="de-DE"/>
           </a:p>
@@ -2308,7 +2308,7 @@
           <a:p>
             <a:fld id="{84A495D8-31AC-6141-A708-923E383D2969}" type="datetime1">
               <a:rPr lang="de-DE" smtClean="0"/>
-              <a:t>01.07.2015</a:t>
+              <a:t>05.09.2015</a:t>
             </a:fld>
             <a:endParaRPr lang="de-DE"/>
           </a:p>
@@ -2426,7 +2426,7 @@
           <a:p>
             <a:fld id="{6B9BBFBE-94A6-EE41-BDE2-C36DF8BDD6AC}" type="datetime1">
               <a:rPr lang="de-DE" smtClean="0"/>
-              <a:t>01.07.2015</a:t>
+              <a:t>05.09.2015</a:t>
             </a:fld>
             <a:endParaRPr lang="de-DE"/>
           </a:p>
@@ -2521,7 +2521,7 @@
           <a:p>
             <a:fld id="{8A3BDDF1-32E1-AA48-AD7E-B28DB9397AA4}" type="datetime1">
               <a:rPr lang="de-DE" smtClean="0"/>
-              <a:t>01.07.2015</a:t>
+              <a:t>05.09.2015</a:t>
             </a:fld>
             <a:endParaRPr lang="de-DE"/>
           </a:p>
@@ -2798,7 +2798,7 @@
           <a:p>
             <a:fld id="{BF30ED29-63A2-654D-9D7C-1CB6D6E00183}" type="datetime1">
               <a:rPr lang="de-DE" smtClean="0"/>
-              <a:t>01.07.2015</a:t>
+              <a:t>05.09.2015</a:t>
             </a:fld>
             <a:endParaRPr lang="de-DE"/>
           </a:p>
@@ -3051,7 +3051,7 @@
           <a:p>
             <a:fld id="{4FB359BF-9004-C740-93E9-376A57F77EA5}" type="datetime1">
               <a:rPr lang="de-DE" smtClean="0"/>
-              <a:t>01.07.2015</a:t>
+              <a:t>05.09.2015</a:t>
             </a:fld>
             <a:endParaRPr lang="de-DE"/>
           </a:p>
@@ -3264,7 +3264,7 @@
           <a:p>
             <a:fld id="{88615D7D-6342-384A-A16F-53E369E57F7B}" type="datetime1">
               <a:rPr lang="de-DE" smtClean="0"/>
-              <a:t>01.07.2015</a:t>
+              <a:t>05.09.2015</a:t>
             </a:fld>
             <a:endParaRPr lang="de-DE"/>
           </a:p>
@@ -4157,14 +4157,14 @@
             <p:ph idx="1"/>
             <p:extLst>
               <p:ext uri="{D42A27DB-BD31-4B8C-83A1-F6EECF244321}">
-                <p14:modId xmlns:p14="http://schemas.microsoft.com/office/powerpoint/2010/main" val="4156818116"/>
+                <p14:modId xmlns:p14="http://schemas.microsoft.com/office/powerpoint/2010/main" val="2392223600"/>
               </p:ext>
             </p:extLst>
           </p:nvPr>
         </p:nvGraphicFramePr>
         <p:xfrm>
           <a:off x="457200" y="1417638"/>
-          <a:ext cx="8389360" cy="5295703"/>
+          <a:ext cx="8389360" cy="5021383"/>
         </p:xfrm>
         <a:graphic>
           <a:graphicData uri="http://schemas.openxmlformats.org/drawingml/2006/table">
@@ -4325,25 +4325,13 @@
                     <a:p>
                       <a:r>
                         <a:rPr lang="de-DE" dirty="0" smtClean="0"/>
-                        <a:t>-  Kamera</a:t>
-                      </a:r>
-                    </a:p>
-                    <a:p>
+                        <a:t>-  </a:t>
+                      </a:r>
                       <a:r>
                         <a:rPr lang="de-DE" dirty="0" smtClean="0"/>
-                        <a:t>-  Licht/Schatten</a:t>
-                      </a:r>
-                    </a:p>
-                    <a:p>
-                      <a:r>
-                        <a:rPr lang="de-DE" dirty="0" smtClean="0"/>
-                        <a:t>-  Essen</a:t>
-                      </a:r>
-                      <a:r>
-                        <a:rPr lang="de-DE" baseline="0" dirty="0" smtClean="0"/>
-                        <a:t> erscheint </a:t>
-                      </a:r>
-                      <a:endParaRPr lang="de-DE" dirty="0"/>
+                        <a:t>Kamera</a:t>
+                      </a:r>
+                      <a:endParaRPr lang="de-DE" dirty="0" smtClean="0"/>
                     </a:p>
                   </a:txBody>
                   <a:tcPr/>
@@ -4516,14 +4504,21 @@
                       </a:r>
                     </a:p>
                     <a:p>
-                      <a:pPr marL="285750" indent="-285750">
-                        <a:buFontTx/>
-                        <a:buChar char="-"/>
-                      </a:pPr>
                       <a:r>
                         <a:rPr lang="de-DE" dirty="0" smtClean="0"/>
-                        <a:t>Gameinteraktion (Start/Pause)</a:t>
-                      </a:r>
+                        <a:t>-  Licht/Schatten</a:t>
+                      </a:r>
+                    </a:p>
+                    <a:p>
+                      <a:r>
+                        <a:rPr lang="de-DE" smtClean="0"/>
+                        <a:t>-  Essen</a:t>
+                      </a:r>
+                      <a:r>
+                        <a:rPr lang="de-DE" baseline="0" smtClean="0"/>
+                        <a:t> erscheint </a:t>
+                      </a:r>
+                      <a:endParaRPr lang="de-DE" smtClean="0"/>
                     </a:p>
                     <a:p>
                       <a:pPr marL="0" indent="0">
@@ -4592,6 +4587,29 @@
                       </a:r>
                     </a:p>
                     <a:p>
+                      <a:pPr marL="285750" marR="0" indent="-285750" algn="l" defTabSz="457200" rtl="0" eaLnBrk="1" fontAlgn="auto" latinLnBrk="0" hangingPunct="1">
+                        <a:lnSpc>
+                          <a:spcPct val="100000"/>
+                        </a:lnSpc>
+                        <a:spcBef>
+                          <a:spcPts val="0"/>
+                        </a:spcBef>
+                        <a:spcAft>
+                          <a:spcPts val="0"/>
+                        </a:spcAft>
+                        <a:buClrTx/>
+                        <a:buSzTx/>
+                        <a:buFontTx/>
+                        <a:buChar char="-"/>
+                        <a:tabLst/>
+                        <a:defRPr/>
+                      </a:pPr>
+                      <a:r>
+                        <a:rPr lang="de-DE" dirty="0" smtClean="0"/>
+                        <a:t>Gameinteraktion (Start/Pause)</a:t>
+                      </a:r>
+                    </a:p>
+                    <a:p>
                       <a:pPr marL="285750" indent="-285750">
                         <a:buFontTx/>
                         <a:buChar char="-"/>
@@ -4633,6 +4651,20 @@
                       <a:r>
                         <a:rPr lang="de-DE" baseline="0" dirty="0" smtClean="0"/>
                         <a:t>Menü</a:t>
+                      </a:r>
+                    </a:p>
+                    <a:p>
+                      <a:pPr marL="285750" indent="-285750">
+                        <a:buFontTx/>
+                        <a:buChar char="-"/>
+                      </a:pPr>
+                      <a:r>
+                        <a:rPr lang="de-DE" baseline="0" dirty="0" smtClean="0"/>
+                        <a:t>-</a:t>
+                      </a:r>
+                      <a:r>
+                        <a:rPr lang="de-DE" baseline="0" dirty="0" err="1" smtClean="0"/>
+                        <a:t>GameOver</a:t>
                       </a:r>
                       <a:endParaRPr lang="de-DE" dirty="0"/>
                     </a:p>

</xml_diff>